<commit_message>
updated the slide deck with the template slides from the latest template updates
</commit_message>
<xml_diff>
--- a/Counter_Malign_Information/4-Implement-For_Instructors/Lesson_Plans/Lesson_02-Identifying_AI_Content/Audio_Visual-Template/Lesson_Slide-LESSON_NAME.pptx
+++ b/Counter_Malign_Information/4-Implement-For_Instructors/Lesson_Plans/Lesson_02-Identifying_AI_Content/Audio_Visual-Template/Lesson_Slide-LESSON_NAME.pptx
@@ -6,13 +6,16 @@
     <p:sldMasterId id="2147483675" r:id="rId2"/>
   </p:sldMasterIdLst>
   <p:notesMasterIdLst>
-    <p:notesMasterId r:id="rId7"/>
+    <p:notesMasterId r:id="rId10"/>
   </p:notesMasterIdLst>
   <p:sldIdLst>
-    <p:sldId id="381" r:id="rId3"/>
-    <p:sldId id="383" r:id="rId4"/>
-    <p:sldId id="619" r:id="rId5"/>
-    <p:sldId id="377" r:id="rId6"/>
+    <p:sldId id="620" r:id="rId3"/>
+    <p:sldId id="621" r:id="rId4"/>
+    <p:sldId id="383" r:id="rId5"/>
+    <p:sldId id="269" r:id="rId6"/>
+    <p:sldId id="270" r:id="rId7"/>
+    <p:sldId id="271" r:id="rId8"/>
+    <p:sldId id="272" r:id="rId9"/>
   </p:sldIdLst>
   <p:sldSz cx="12192000" cy="6858000"/>
   <p:notesSz cx="6858000" cy="9144000"/>
@@ -541,6 +544,236 @@
 </p:notesMaster>
 </file>
 
+<file path=ppt/notesSlides/notesSlide1.xml><?xml version="1.0" encoding="utf-8"?>
+<p:notes xmlns:a="http://schemas.openxmlformats.org/drawingml/2006/main" xmlns:r="http://schemas.openxmlformats.org/officeDocument/2006/relationships" xmlns:p="http://schemas.openxmlformats.org/presentationml/2006/main">
+  <p:cSld>
+    <p:spTree>
+      <p:nvGrpSpPr>
+        <p:cNvPr id="1" name=""/>
+        <p:cNvGrpSpPr/>
+        <p:nvPr/>
+      </p:nvGrpSpPr>
+      <p:grpSpPr>
+        <a:xfrm>
+          <a:off x="0" y="0"/>
+          <a:ext cx="0" cy="0"/>
+          <a:chOff x="0" y="0"/>
+          <a:chExt cx="0" cy="0"/>
+        </a:xfrm>
+      </p:grpSpPr>
+      <p:sp>
+        <p:nvSpPr>
+          <p:cNvPr id="2" name="Slide Image Placeholder 1"/>
+          <p:cNvSpPr>
+            <a:spLocks noGrp="1" noRot="1" noChangeAspect="1"/>
+          </p:cNvSpPr>
+          <p:nvPr>
+            <p:ph type="sldImg"/>
+          </p:nvPr>
+        </p:nvSpPr>
+        <p:spPr>
+          <a:xfrm>
+            <a:off x="382588" y="695325"/>
+            <a:ext cx="6092825" cy="3427413"/>
+          </a:xfrm>
+        </p:spPr>
+      </p:sp>
+      <p:sp>
+        <p:nvSpPr>
+          <p:cNvPr id="3" name="Notes Placeholder 2"/>
+          <p:cNvSpPr>
+            <a:spLocks noGrp="1"/>
+          </p:cNvSpPr>
+          <p:nvPr>
+            <p:ph type="body" idx="1"/>
+          </p:nvPr>
+        </p:nvSpPr>
+        <p:spPr/>
+        <p:txBody>
+          <a:bodyPr/>
+          <a:lstStyle/>
+          <a:p>
+            <a:r>
+              <a:rPr lang="en-US" dirty="0"/>
+              <a:t>Start by creating a slide master that is in English. As needed duplicate and translate slides into target language. Color English slides in Yellow and target language slides in white. </a:t>
+            </a:r>
+            <a:br>
+              <a:rPr lang="en-US" dirty="0"/>
+            </a:br>
+            <a:br>
+              <a:rPr lang="en-US" dirty="0"/>
+            </a:br>
+            <a:r>
+              <a:rPr lang="en-US" dirty="0"/>
+              <a:t>The example below uses Spanish as a theoretical target language. </a:t>
+            </a:r>
+          </a:p>
+        </p:txBody>
+      </p:sp>
+      <p:sp>
+        <p:nvSpPr>
+          <p:cNvPr id="4" name="Slide Number Placeholder 3"/>
+          <p:cNvSpPr>
+            <a:spLocks noGrp="1"/>
+          </p:cNvSpPr>
+          <p:nvPr>
+            <p:ph type="sldNum" idx="8"/>
+          </p:nvPr>
+        </p:nvSpPr>
+        <p:spPr/>
+        <p:txBody>
+          <a:bodyPr/>
+          <a:lstStyle/>
+          <a:p>
+            <a:pPr indent="0" algn="r">
+              <a:buNone/>
+            </a:pPr>
+            <a:fld id="{96D071C0-0F6A-4E5C-B3E5-B824FE66220F}" type="slidenum">
+              <a:rPr lang="en-US" sz="1400" b="0" strike="noStrike" spc="-1" smtClean="0">
+                <a:solidFill>
+                  <a:srgbClr val="000000"/>
+                </a:solidFill>
+                <a:latin typeface="Times New Roman"/>
+              </a:rPr>
+              <a:t>1</a:t>
+            </a:fld>
+            <a:endParaRPr lang="en-US" sz="1400" b="0" strike="noStrike" spc="-1">
+              <a:solidFill>
+                <a:srgbClr val="000000"/>
+              </a:solidFill>
+              <a:latin typeface="Times New Roman"/>
+            </a:endParaRPr>
+          </a:p>
+        </p:txBody>
+      </p:sp>
+    </p:spTree>
+    <p:extLst>
+      <p:ext uri="{BB962C8B-B14F-4D97-AF65-F5344CB8AC3E}">
+        <p14:creationId xmlns:p14="http://schemas.microsoft.com/office/powerpoint/2010/main" val="1278001126"/>
+      </p:ext>
+    </p:extLst>
+  </p:cSld>
+  <p:clrMapOvr>
+    <a:masterClrMapping/>
+  </p:clrMapOvr>
+</p:notes>
+</file>
+
+<file path=ppt/notesSlides/notesSlide2.xml><?xml version="1.0" encoding="utf-8"?>
+<p:notes xmlns:a="http://schemas.openxmlformats.org/drawingml/2006/main" xmlns:r="http://schemas.openxmlformats.org/officeDocument/2006/relationships" xmlns:p="http://schemas.openxmlformats.org/presentationml/2006/main">
+  <p:cSld>
+    <p:spTree>
+      <p:nvGrpSpPr>
+        <p:cNvPr id="1" name=""/>
+        <p:cNvGrpSpPr/>
+        <p:nvPr/>
+      </p:nvGrpSpPr>
+      <p:grpSpPr>
+        <a:xfrm>
+          <a:off x="0" y="0"/>
+          <a:ext cx="0" cy="0"/>
+          <a:chOff x="0" y="0"/>
+          <a:chExt cx="0" cy="0"/>
+        </a:xfrm>
+      </p:grpSpPr>
+      <p:sp>
+        <p:nvSpPr>
+          <p:cNvPr id="2" name="Slide Image Placeholder 1"/>
+          <p:cNvSpPr>
+            <a:spLocks noGrp="1" noRot="1" noChangeAspect="1"/>
+          </p:cNvSpPr>
+          <p:nvPr>
+            <p:ph type="sldImg"/>
+          </p:nvPr>
+        </p:nvSpPr>
+        <p:spPr>
+          <a:xfrm>
+            <a:off x="382588" y="695325"/>
+            <a:ext cx="6092825" cy="3427413"/>
+          </a:xfrm>
+        </p:spPr>
+      </p:sp>
+      <p:sp>
+        <p:nvSpPr>
+          <p:cNvPr id="3" name="Notes Placeholder 2"/>
+          <p:cNvSpPr>
+            <a:spLocks noGrp="1"/>
+          </p:cNvSpPr>
+          <p:nvPr>
+            <p:ph type="body" idx="1"/>
+          </p:nvPr>
+        </p:nvSpPr>
+        <p:spPr/>
+        <p:txBody>
+          <a:bodyPr/>
+          <a:lstStyle/>
+          <a:p>
+            <a:r>
+              <a:rPr lang="en-US" dirty="0"/>
+              <a:t>Start by creating a slide master that is in English. As needed duplicate and translate slides into target language. Color English slides in Yellow and target language slides in white. </a:t>
+            </a:r>
+            <a:br>
+              <a:rPr lang="en-US" dirty="0"/>
+            </a:br>
+            <a:br>
+              <a:rPr lang="en-US" dirty="0"/>
+            </a:br>
+            <a:r>
+              <a:rPr lang="en-US" dirty="0"/>
+              <a:t>The example below uses Spanish as a theoretical target language. </a:t>
+            </a:r>
+          </a:p>
+        </p:txBody>
+      </p:sp>
+      <p:sp>
+        <p:nvSpPr>
+          <p:cNvPr id="4" name="Slide Number Placeholder 3"/>
+          <p:cNvSpPr>
+            <a:spLocks noGrp="1"/>
+          </p:cNvSpPr>
+          <p:nvPr>
+            <p:ph type="sldNum" idx="8"/>
+          </p:nvPr>
+        </p:nvSpPr>
+        <p:spPr/>
+        <p:txBody>
+          <a:bodyPr/>
+          <a:lstStyle/>
+          <a:p>
+            <a:pPr indent="0" algn="r">
+              <a:buNone/>
+            </a:pPr>
+            <a:fld id="{96D071C0-0F6A-4E5C-B3E5-B824FE66220F}" type="slidenum">
+              <a:rPr lang="en-US" sz="1400" b="0" strike="noStrike" spc="-1" smtClean="0">
+                <a:solidFill>
+                  <a:srgbClr val="000000"/>
+                </a:solidFill>
+                <a:latin typeface="Times New Roman"/>
+              </a:rPr>
+              <a:t>2</a:t>
+            </a:fld>
+            <a:endParaRPr lang="en-US" sz="1400" b="0" strike="noStrike" spc="-1">
+              <a:solidFill>
+                <a:srgbClr val="000000"/>
+              </a:solidFill>
+              <a:latin typeface="Times New Roman"/>
+            </a:endParaRPr>
+          </a:p>
+        </p:txBody>
+      </p:sp>
+    </p:spTree>
+    <p:extLst>
+      <p:ext uri="{BB962C8B-B14F-4D97-AF65-F5344CB8AC3E}">
+        <p14:creationId xmlns:p14="http://schemas.microsoft.com/office/powerpoint/2010/main" val="2282271852"/>
+      </p:ext>
+    </p:extLst>
+  </p:cSld>
+  <p:clrMapOvr>
+    <a:masterClrMapping/>
+  </p:clrMapOvr>
+</p:notes>
+</file>
+
 <file path=ppt/slideLayouts/slideLayout1.xml><?xml version="1.0" encoding="utf-8"?>
 <p:sldLayout xmlns:a="http://schemas.openxmlformats.org/drawingml/2006/main" xmlns:r="http://schemas.openxmlformats.org/officeDocument/2006/relationships" xmlns:p="http://schemas.openxmlformats.org/presentationml/2006/main" type="title" preserve="1">
   <p:cSld name="Title Slide">
@@ -688,7 +921,7 @@
           <a:p>
             <a:fld id="{19E3F066-8095-7A47-8BBF-FB45577C0028}" type="datetimeFigureOut">
               <a:rPr lang="en-US" smtClean="0"/>
-              <a:t>11/29/22</a:t>
+              <a:t>6/19/24</a:t>
             </a:fld>
             <a:endParaRPr lang="en-US"/>
           </a:p>
@@ -886,7 +1119,7 @@
           <a:p>
             <a:fld id="{19E3F066-8095-7A47-8BBF-FB45577C0028}" type="datetimeFigureOut">
               <a:rPr lang="en-US" smtClean="0"/>
-              <a:t>11/29/22</a:t>
+              <a:t>6/19/24</a:t>
             </a:fld>
             <a:endParaRPr lang="en-US"/>
           </a:p>
@@ -1094,7 +1327,7 @@
           <a:p>
             <a:fld id="{19E3F066-8095-7A47-8BBF-FB45577C0028}" type="datetimeFigureOut">
               <a:rPr lang="en-US" smtClean="0"/>
-              <a:t>11/29/22</a:t>
+              <a:t>6/19/24</a:t>
             </a:fld>
             <a:endParaRPr lang="en-US"/>
           </a:p>
@@ -1168,7 +1401,146 @@
 </file>
 
 <file path=ppt/slideLayouts/slideLayout12.xml><?xml version="1.0" encoding="utf-8"?>
-<p:sldLayout xmlns:a="http://schemas.openxmlformats.org/drawingml/2006/main" xmlns:r="http://schemas.openxmlformats.org/officeDocument/2006/relationships" xmlns:p="http://schemas.openxmlformats.org/presentationml/2006/main" userDrawn="1">
+<p:sldLayout xmlns:a="http://schemas.openxmlformats.org/drawingml/2006/main" xmlns:r="http://schemas.openxmlformats.org/officeDocument/2006/relationships" xmlns:p="http://schemas.openxmlformats.org/presentationml/2006/main" type="tx">
+  <p:cSld name="Title, Content">
+    <p:spTree>
+      <p:nvGrpSpPr>
+        <p:cNvPr id="1" name=""/>
+        <p:cNvGrpSpPr/>
+        <p:nvPr/>
+      </p:nvGrpSpPr>
+      <p:grpSpPr>
+        <a:xfrm>
+          <a:off x="0" y="0"/>
+          <a:ext cx="0" cy="0"/>
+          <a:chOff x="0" y="0"/>
+          <a:chExt cx="0" cy="0"/>
+        </a:xfrm>
+      </p:grpSpPr>
+      <p:sp>
+        <p:nvSpPr>
+          <p:cNvPr id="99" name="Body Level One…"/>
+          <p:cNvSpPr txBox="1">
+            <a:spLocks noGrp="1"/>
+          </p:cNvSpPr>
+          <p:nvPr>
+            <p:ph type="body" idx="1"/>
+          </p:nvPr>
+        </p:nvSpPr>
+        <p:spPr>
+          <a:xfrm>
+            <a:off x="609479" y="1604519"/>
+            <a:ext cx="10972442" cy="3977282"/>
+          </a:xfrm>
+          <a:prstGeom prst="rect">
+            <a:avLst/>
+          </a:prstGeom>
+        </p:spPr>
+        <p:txBody>
+          <a:bodyPr lIns="0" tIns="0" rIns="0" bIns="0"/>
+          <a:lstStyle/>
+          <a:p>
+            <a:r>
+              <a:t>Body Level One</a:t>
+            </a:r>
+          </a:p>
+          <a:p>
+            <a:pPr lvl="1"/>
+            <a:r>
+              <a:t>Body Level Two</a:t>
+            </a:r>
+          </a:p>
+          <a:p>
+            <a:pPr lvl="2"/>
+            <a:r>
+              <a:t>Body Level Three</a:t>
+            </a:r>
+          </a:p>
+          <a:p>
+            <a:pPr lvl="3"/>
+            <a:r>
+              <a:t>Body Level Four</a:t>
+            </a:r>
+          </a:p>
+          <a:p>
+            <a:pPr lvl="4"/>
+            <a:r>
+              <a:t>Body Level Five</a:t>
+            </a:r>
+          </a:p>
+        </p:txBody>
+      </p:sp>
+      <p:sp>
+        <p:nvSpPr>
+          <p:cNvPr id="100" name="Title Text"/>
+          <p:cNvSpPr txBox="1">
+            <a:spLocks noGrp="1"/>
+          </p:cNvSpPr>
+          <p:nvPr>
+            <p:ph type="title"/>
+          </p:nvPr>
+        </p:nvSpPr>
+        <p:spPr>
+          <a:prstGeom prst="rect">
+            <a:avLst/>
+          </a:prstGeom>
+        </p:spPr>
+        <p:txBody>
+          <a:bodyPr/>
+          <a:lstStyle>
+            <a:lvl1pPr>
+              <a:defRPr sz="3800"/>
+            </a:lvl1pPr>
+          </a:lstStyle>
+          <a:p>
+            <a:r>
+              <a:t>Title Text</a:t>
+            </a:r>
+          </a:p>
+        </p:txBody>
+      </p:sp>
+      <p:sp>
+        <p:nvSpPr>
+          <p:cNvPr id="101" name="Slide Number"/>
+          <p:cNvSpPr txBox="1">
+            <a:spLocks noGrp="1"/>
+          </p:cNvSpPr>
+          <p:nvPr>
+            <p:ph type="sldNum" sz="quarter" idx="2"/>
+          </p:nvPr>
+        </p:nvSpPr>
+        <p:spPr>
+          <a:prstGeom prst="rect">
+            <a:avLst/>
+          </a:prstGeom>
+        </p:spPr>
+        <p:txBody>
+          <a:bodyPr/>
+          <a:lstStyle/>
+          <a:p>
+            <a:fld id="{86CB4B4D-7CA3-9044-876B-883B54F8677D}" type="slidenum">
+              <a:t>‹#›</a:t>
+            </a:fld>
+            <a:endParaRPr/>
+          </a:p>
+        </p:txBody>
+      </p:sp>
+    </p:spTree>
+    <p:extLst>
+      <p:ext uri="{BB962C8B-B14F-4D97-AF65-F5344CB8AC3E}">
+        <p14:creationId xmlns:p14="http://schemas.microsoft.com/office/powerpoint/2010/main" val="1467156308"/>
+      </p:ext>
+    </p:extLst>
+  </p:cSld>
+  <p:clrMapOvr>
+    <a:masterClrMapping/>
+  </p:clrMapOvr>
+  <p:transition spd="med"/>
+</p:sldLayout>
+</file>
+
+<file path=ppt/slideLayouts/slideLayout13.xml><?xml version="1.0" encoding="utf-8"?>
+<p:sldLayout xmlns:a="http://schemas.openxmlformats.org/drawingml/2006/main" xmlns:r="http://schemas.openxmlformats.org/officeDocument/2006/relationships" xmlns:p="http://schemas.openxmlformats.org/presentationml/2006/main" type="tx">
   <p:cSld name="Custom Layout">
     <p:spTree>
       <p:nvGrpSpPr>
@@ -1186,232 +1558,41 @@
       </p:grpSpPr>
       <p:sp>
         <p:nvSpPr>
-          <p:cNvPr id="3" name="Date Placeholder 2">
-            <a:extLst>
-              <a:ext uri="{FF2B5EF4-FFF2-40B4-BE49-F238E27FC236}">
-                <a16:creationId xmlns:a16="http://schemas.microsoft.com/office/drawing/2014/main" id="{D920545E-15F6-B470-A814-7BCEBD3C6EA7}"/>
-              </a:ext>
-            </a:extLst>
-          </p:cNvPr>
-          <p:cNvSpPr>
-            <a:spLocks noGrp="1"/>
-          </p:cNvSpPr>
-          <p:nvPr>
-            <p:ph type="dt" sz="half" idx="10"/>
-          </p:nvPr>
-        </p:nvSpPr>
-        <p:spPr/>
+          <p:cNvPr id="92" name="Slide Number"/>
+          <p:cNvSpPr txBox="1">
+            <a:spLocks noGrp="1"/>
+          </p:cNvSpPr>
+          <p:nvPr>
+            <p:ph type="sldNum" sz="quarter" idx="2"/>
+          </p:nvPr>
+        </p:nvSpPr>
+        <p:spPr>
+          <a:prstGeom prst="rect">
+            <a:avLst/>
+          </a:prstGeom>
+        </p:spPr>
         <p:txBody>
           <a:bodyPr/>
           <a:lstStyle/>
           <a:p>
-            <a:fld id="{D22EE3CE-13A9-674D-B3E7-8F60B492096B}" type="datetimeFigureOut">
-              <a:rPr lang="en-US" smtClean="0"/>
-              <a:t>11/29/22</a:t>
-            </a:fld>
-            <a:endParaRPr lang="en-US"/>
-          </a:p>
-        </p:txBody>
-      </p:sp>
-      <p:sp>
-        <p:nvSpPr>
-          <p:cNvPr id="4" name="Footer Placeholder 3">
-            <a:extLst>
-              <a:ext uri="{FF2B5EF4-FFF2-40B4-BE49-F238E27FC236}">
-                <a16:creationId xmlns:a16="http://schemas.microsoft.com/office/drawing/2014/main" id="{42E62649-07F8-D840-FA56-828B5C57A7DE}"/>
-              </a:ext>
-            </a:extLst>
-          </p:cNvPr>
-          <p:cNvSpPr>
-            <a:spLocks noGrp="1"/>
-          </p:cNvSpPr>
-          <p:nvPr>
-            <p:ph type="ftr" sz="quarter" idx="11"/>
-          </p:nvPr>
-        </p:nvSpPr>
-        <p:spPr/>
-        <p:txBody>
-          <a:bodyPr/>
-          <a:lstStyle/>
-          <a:p>
-            <a:endParaRPr lang="en-US"/>
-          </a:p>
-        </p:txBody>
-      </p:sp>
-      <p:sp>
-        <p:nvSpPr>
-          <p:cNvPr id="5" name="Slide Number Placeholder 4">
-            <a:extLst>
-              <a:ext uri="{FF2B5EF4-FFF2-40B4-BE49-F238E27FC236}">
-                <a16:creationId xmlns:a16="http://schemas.microsoft.com/office/drawing/2014/main" id="{CF1BE7ED-0344-E171-1F8B-122276FD66A3}"/>
-              </a:ext>
-            </a:extLst>
-          </p:cNvPr>
-          <p:cNvSpPr>
-            <a:spLocks noGrp="1"/>
-          </p:cNvSpPr>
-          <p:nvPr>
-            <p:ph type="sldNum" sz="quarter" idx="12"/>
-          </p:nvPr>
-        </p:nvSpPr>
-        <p:spPr/>
-        <p:txBody>
-          <a:bodyPr/>
-          <a:lstStyle/>
-          <a:p>
-            <a:fld id="{4006B354-493D-154F-8DC8-7675D268A9F2}" type="slidenum">
-              <a:rPr lang="en-US" smtClean="0"/>
+            <a:fld id="{86CB4B4D-7CA3-9044-876B-883B54F8677D}" type="slidenum">
               <a:t>‹#›</a:t>
             </a:fld>
-            <a:endParaRPr lang="en-US"/>
+            <a:endParaRPr/>
           </a:p>
         </p:txBody>
       </p:sp>
     </p:spTree>
     <p:extLst>
       <p:ext uri="{BB962C8B-B14F-4D97-AF65-F5344CB8AC3E}">
-        <p14:creationId xmlns:p14="http://schemas.microsoft.com/office/powerpoint/2010/main" val="2299448291"/>
+        <p14:creationId xmlns:p14="http://schemas.microsoft.com/office/powerpoint/2010/main" val="3501166409"/>
       </p:ext>
     </p:extLst>
   </p:cSld>
   <p:clrMapOvr>
     <a:masterClrMapping/>
   </p:clrMapOvr>
-</p:sldLayout>
-</file>
-
-<file path=ppt/slideLayouts/slideLayout13.xml><?xml version="1.0" encoding="utf-8"?>
-<p:sldLayout xmlns:a="http://schemas.openxmlformats.org/drawingml/2006/main" xmlns:r="http://schemas.openxmlformats.org/officeDocument/2006/relationships" xmlns:p="http://schemas.openxmlformats.org/presentationml/2006/main" userDrawn="1">
-  <p:cSld name="Title, Content">
-    <p:spTree>
-      <p:nvGrpSpPr>
-        <p:cNvPr id="1" name=""/>
-        <p:cNvGrpSpPr/>
-        <p:nvPr/>
-      </p:nvGrpSpPr>
-      <p:grpSpPr>
-        <a:xfrm>
-          <a:off x="0" y="0"/>
-          <a:ext cx="0" cy="0"/>
-          <a:chOff x="0" y="0"/>
-          <a:chExt cx="0" cy="0"/>
-        </a:xfrm>
-      </p:grpSpPr>
-      <p:sp>
-        <p:nvSpPr>
-          <p:cNvPr id="107" name="PlaceHolder 2"/>
-          <p:cNvSpPr>
-            <a:spLocks noGrp="1"/>
-          </p:cNvSpPr>
-          <p:nvPr>
-            <p:ph/>
-          </p:nvPr>
-        </p:nvSpPr>
-        <p:spPr>
-          <a:xfrm>
-            <a:off x="609480" y="1604520"/>
-            <a:ext cx="10972440" cy="3977280"/>
-          </a:xfrm>
-          <a:prstGeom prst="rect">
-            <a:avLst/>
-          </a:prstGeom>
-          <a:noFill/>
-          <a:ln w="0">
-            <a:noFill/>
-          </a:ln>
-        </p:spPr>
-        <p:txBody>
-          <a:bodyPr lIns="0" tIns="0" rIns="0" bIns="0" anchor="t">
-            <a:normAutofit/>
-          </a:bodyPr>
-          <a:lstStyle/>
-          <a:p>
-            <a:pPr>
-              <a:lnSpc>
-                <a:spcPct val="93000"/>
-              </a:lnSpc>
-              <a:spcBef>
-                <a:spcPts val="1417"/>
-              </a:spcBef>
-              <a:buNone/>
-            </a:pPr>
-            <a:endParaRPr lang="en-US" sz="3200" b="0" strike="noStrike" spc="-1">
-              <a:solidFill>
-                <a:srgbClr val="000000"/>
-              </a:solidFill>
-              <a:latin typeface="Arial"/>
-            </a:endParaRPr>
-          </a:p>
-        </p:txBody>
-      </p:sp>
-      <p:sp>
-        <p:nvSpPr>
-          <p:cNvPr id="4" name="PlaceHolder 3"/>
-          <p:cNvSpPr>
-            <a:spLocks noGrp="1"/>
-          </p:cNvSpPr>
-          <p:nvPr>
-            <p:ph type="sldNum" idx="2"/>
-          </p:nvPr>
-        </p:nvSpPr>
-        <p:spPr/>
-        <p:txBody>
-          <a:bodyPr/>
-          <a:lstStyle/>
-          <a:p>
-            <a:fld id="{DD075454-311C-4D4F-B5E5-C906898B1750}" type="slidenum">
-              <a:t>‹#›</a:t>
-            </a:fld>
-            <a:endParaRPr/>
-          </a:p>
-        </p:txBody>
-      </p:sp>
-      <p:sp>
-        <p:nvSpPr>
-          <p:cNvPr id="6" name="Title 5">
-            <a:extLst>
-              <a:ext uri="{FF2B5EF4-FFF2-40B4-BE49-F238E27FC236}">
-                <a16:creationId xmlns:a16="http://schemas.microsoft.com/office/drawing/2014/main" id="{88B2C156-1D50-25CA-8EFB-B1EAB833CB9C}"/>
-              </a:ext>
-            </a:extLst>
-          </p:cNvPr>
-          <p:cNvSpPr>
-            <a:spLocks noGrp="1"/>
-          </p:cNvSpPr>
-          <p:nvPr>
-            <p:ph type="title"/>
-          </p:nvPr>
-        </p:nvSpPr>
-        <p:spPr/>
-        <p:txBody>
-          <a:bodyPr>
-            <a:normAutofit/>
-          </a:bodyPr>
-          <a:lstStyle>
-            <a:lvl1pPr marL="0" indent="0">
-              <a:buFont typeface="Arial" panose="020B0604020202020204" pitchFamily="34" charset="0"/>
-              <a:buNone/>
-              <a:defRPr sz="3800"/>
-            </a:lvl1pPr>
-          </a:lstStyle>
-          <a:p>
-            <a:r>
-              <a:rPr lang="en-US" dirty="0"/>
-              <a:t>Click to edit Master title style</a:t>
-            </a:r>
-          </a:p>
-        </p:txBody>
-      </p:sp>
-    </p:spTree>
-    <p:extLst>
-      <p:ext uri="{BB962C8B-B14F-4D97-AF65-F5344CB8AC3E}">
-        <p14:creationId xmlns:p14="http://schemas.microsoft.com/office/powerpoint/2010/main" val="2374531096"/>
-      </p:ext>
-    </p:extLst>
-  </p:cSld>
-  <p:clrMapOvr>
-    <a:masterClrMapping/>
-  </p:clrMapOvr>
+  <p:transition spd="med"/>
 </p:sldLayout>
 </file>
 
@@ -1462,55 +1643,26 @@
           <a:chExt cx="0" cy="0"/>
         </a:xfrm>
       </p:grpSpPr>
-      <p:pic>
-        <p:nvPicPr>
-          <p:cNvPr id="2" name="4DF-LOGO.png" descr="4DF-LOGO.png">
-            <a:extLst>
-              <a:ext uri="{FF2B5EF4-FFF2-40B4-BE49-F238E27FC236}">
-                <a16:creationId xmlns:a16="http://schemas.microsoft.com/office/drawing/2014/main" id="{C3B271E5-B70C-182B-E535-C58E4DF3169C}"/>
-              </a:ext>
-            </a:extLst>
-          </p:cNvPr>
-          <p:cNvPicPr/>
-          <p:nvPr userDrawn="1"/>
-        </p:nvPicPr>
-        <p:blipFill>
-          <a:blip r:embed="rId2"/>
-          <a:stretch/>
-        </p:blipFill>
+      <p:sp>
+        <p:nvSpPr>
+          <p:cNvPr id="3" name="PlaceHolder 2">
+            <a:extLst>
+              <a:ext uri="{FF2B5EF4-FFF2-40B4-BE49-F238E27FC236}">
+                <a16:creationId xmlns:a16="http://schemas.microsoft.com/office/drawing/2014/main" id="{790EC06F-46E0-0D58-4347-2E509D63E25A}"/>
+              </a:ext>
+            </a:extLst>
+          </p:cNvPr>
+          <p:cNvSpPr>
+            <a:spLocks noGrp="1"/>
+          </p:cNvSpPr>
+          <p:nvPr>
+            <p:ph/>
+          </p:nvPr>
+        </p:nvSpPr>
         <p:spPr>
           <a:xfrm>
-            <a:off x="50760" y="1641960"/>
-            <a:ext cx="4494240" cy="4334040"/>
-          </a:xfrm>
-          <a:prstGeom prst="rect">
-            <a:avLst/>
-          </a:prstGeom>
-          <a:ln w="12600">
-            <a:noFill/>
-          </a:ln>
-        </p:spPr>
-      </p:pic>
-      <p:sp>
-        <p:nvSpPr>
-          <p:cNvPr id="3" name="PlaceHolder 2">
-            <a:extLst>
-              <a:ext uri="{FF2B5EF4-FFF2-40B4-BE49-F238E27FC236}">
-                <a16:creationId xmlns:a16="http://schemas.microsoft.com/office/drawing/2014/main" id="{790EC06F-46E0-0D58-4347-2E509D63E25A}"/>
-              </a:ext>
-            </a:extLst>
-          </p:cNvPr>
-          <p:cNvSpPr>
-            <a:spLocks noGrp="1"/>
-          </p:cNvSpPr>
-          <p:nvPr>
-            <p:ph/>
-          </p:nvPr>
-        </p:nvSpPr>
-        <p:spPr>
-          <a:xfrm>
-            <a:off x="3296672" y="2950685"/>
-            <a:ext cx="8533378" cy="2704116"/>
+            <a:off x="375127" y="2963211"/>
+            <a:ext cx="11441743" cy="1873119"/>
           </a:xfrm>
           <a:prstGeom prst="rect">
             <a:avLst/>
@@ -1825,7 +1977,7 @@
           <a:p>
             <a:fld id="{19E3F066-8095-7A47-8BBF-FB45577C0028}" type="datetimeFigureOut">
               <a:rPr lang="en-US" smtClean="0"/>
-              <a:t>11/29/22</a:t>
+              <a:t>6/19/24</a:t>
             </a:fld>
             <a:endParaRPr lang="en-US"/>
           </a:p>
@@ -2100,7 +2252,7 @@
           <a:p>
             <a:fld id="{19E3F066-8095-7A47-8BBF-FB45577C0028}" type="datetimeFigureOut">
               <a:rPr lang="en-US" smtClean="0"/>
-              <a:t>11/29/22</a:t>
+              <a:t>6/19/24</a:t>
             </a:fld>
             <a:endParaRPr lang="en-US"/>
           </a:p>
@@ -2365,7 +2517,7 @@
           <a:p>
             <a:fld id="{19E3F066-8095-7A47-8BBF-FB45577C0028}" type="datetimeFigureOut">
               <a:rPr lang="en-US" smtClean="0"/>
-              <a:t>11/29/22</a:t>
+              <a:t>6/19/24</a:t>
             </a:fld>
             <a:endParaRPr lang="en-US"/>
           </a:p>
@@ -2777,7 +2929,7 @@
           <a:p>
             <a:fld id="{19E3F066-8095-7A47-8BBF-FB45577C0028}" type="datetimeFigureOut">
               <a:rPr lang="en-US" smtClean="0"/>
-              <a:t>11/29/22</a:t>
+              <a:t>6/19/24</a:t>
             </a:fld>
             <a:endParaRPr lang="en-US"/>
           </a:p>
@@ -2918,7 +3070,7 @@
           <a:p>
             <a:fld id="{19E3F066-8095-7A47-8BBF-FB45577C0028}" type="datetimeFigureOut">
               <a:rPr lang="en-US" smtClean="0"/>
-              <a:t>11/29/22</a:t>
+              <a:t>6/19/24</a:t>
             </a:fld>
             <a:endParaRPr lang="en-US"/>
           </a:p>
@@ -3031,7 +3183,7 @@
           <a:p>
             <a:fld id="{19E3F066-8095-7A47-8BBF-FB45577C0028}" type="datetimeFigureOut">
               <a:rPr lang="en-US" smtClean="0"/>
-              <a:t>11/29/22</a:t>
+              <a:t>6/19/24</a:t>
             </a:fld>
             <a:endParaRPr lang="en-US"/>
           </a:p>
@@ -3342,7 +3494,7 @@
           <a:p>
             <a:fld id="{19E3F066-8095-7A47-8BBF-FB45577C0028}" type="datetimeFigureOut">
               <a:rPr lang="en-US" smtClean="0"/>
-              <a:t>11/29/22</a:t>
+              <a:t>6/19/24</a:t>
             </a:fld>
             <a:endParaRPr lang="en-US"/>
           </a:p>
@@ -3630,7 +3782,7 @@
           <a:p>
             <a:fld id="{19E3F066-8095-7A47-8BBF-FB45577C0028}" type="datetimeFigureOut">
               <a:rPr lang="en-US" smtClean="0"/>
-              <a:t>11/29/22</a:t>
+              <a:t>6/19/24</a:t>
             </a:fld>
             <a:endParaRPr lang="en-US"/>
           </a:p>
@@ -3871,7 +4023,7 @@
           <a:p>
             <a:fld id="{19E3F066-8095-7A47-8BBF-FB45577C0028}" type="datetimeFigureOut">
               <a:rPr lang="en-US" smtClean="0"/>
-              <a:t>11/29/22</a:t>
+              <a:t>6/19/24</a:t>
             </a:fld>
             <a:endParaRPr lang="en-US"/>
           </a:p>
@@ -3967,35 +4119,6 @@
           </a:p>
         </p:txBody>
       </p:sp>
-      <p:pic>
-        <p:nvPicPr>
-          <p:cNvPr id="7" name="Picture 5" descr="Picture 5">
-            <a:extLst>
-              <a:ext uri="{FF2B5EF4-FFF2-40B4-BE49-F238E27FC236}">
-                <a16:creationId xmlns:a16="http://schemas.microsoft.com/office/drawing/2014/main" id="{83CEF512-4023-EEB1-ADDB-E379BF8A37B4}"/>
-              </a:ext>
-            </a:extLst>
-          </p:cNvPr>
-          <p:cNvPicPr/>
-          <p:nvPr userDrawn="1"/>
-        </p:nvPicPr>
-        <p:blipFill>
-          <a:blip r:embed="rId15"/>
-          <a:stretch/>
-        </p:blipFill>
-        <p:spPr>
-          <a:xfrm>
-            <a:off x="9525" y="0"/>
-            <a:ext cx="1470960" cy="1201680"/>
-          </a:xfrm>
-          <a:prstGeom prst="rect">
-            <a:avLst/>
-          </a:prstGeom>
-          <a:ln w="12600">
-            <a:noFill/>
-          </a:ln>
-        </p:spPr>
-      </p:pic>
     </p:spTree>
     <p:extLst>
       <p:ext uri="{BB962C8B-B14F-4D97-AF65-F5344CB8AC3E}">
@@ -4016,8 +4139,8 @@
     <p:sldLayoutId id="2147483688" r:id="rId9"/>
     <p:sldLayoutId id="2147483689" r:id="rId10"/>
     <p:sldLayoutId id="2147483690" r:id="rId11"/>
-    <p:sldLayoutId id="2147483692" r:id="rId12"/>
-    <p:sldLayoutId id="2147483693" r:id="rId13"/>
+    <p:sldLayoutId id="2147483691" r:id="rId12"/>
+    <p:sldLayoutId id="2147483692" r:id="rId13"/>
   </p:sldLayoutIdLst>
   <p:txStyles>
     <p:titleStyle>
@@ -4365,7 +4488,7 @@
           <a:p>
             <a:fld id="{9530ACA4-BD8C-D448-95CA-FC1634E9A82C}" type="datetimeFigureOut">
               <a:rPr lang="en-US" smtClean="0"/>
-              <a:t>11/29/22</a:t>
+              <a:t>6/19/24</a:t>
             </a:fld>
             <a:endParaRPr lang="en-US"/>
           </a:p>
@@ -4759,6 +4882,14 @@
 <file path=ppt/slides/slide1.xml><?xml version="1.0" encoding="utf-8"?>
 <p:sld xmlns:a="http://schemas.openxmlformats.org/drawingml/2006/main" xmlns:r="http://schemas.openxmlformats.org/officeDocument/2006/relationships" xmlns:p="http://schemas.openxmlformats.org/presentationml/2006/main">
   <p:cSld>
+    <p:bg>
+      <p:bgPr>
+        <a:solidFill>
+          <a:schemeClr val="accent4"/>
+        </a:solidFill>
+        <a:effectLst/>
+      </p:bgPr>
+    </p:bg>
     <p:spTree>
       <p:nvGrpSpPr>
         <p:cNvPr id="1" name=""/>
@@ -4778,7 +4909,7 @@
           <p:cNvPr id="2" name="Content Placeholder 1">
             <a:extLst>
               <a:ext uri="{FF2B5EF4-FFF2-40B4-BE49-F238E27FC236}">
-                <a16:creationId xmlns:a16="http://schemas.microsoft.com/office/drawing/2014/main" id="{6424299D-535A-EE7B-7BBB-37752CDCE2B3}"/>
+                <a16:creationId xmlns:a16="http://schemas.microsoft.com/office/drawing/2014/main" id="{7C1822AB-D5F0-D579-A820-812EE3C83EDD}"/>
               </a:ext>
             </a:extLst>
           </p:cNvPr>
@@ -4791,8 +4922,8 @@
         </p:nvSpPr>
         <p:spPr>
           <a:xfrm>
-            <a:off x="3296672" y="2950685"/>
-            <a:ext cx="8533378" cy="2020339"/>
+            <a:off x="349035" y="2817753"/>
+            <a:ext cx="11441743" cy="2020339"/>
           </a:xfrm>
         </p:spPr>
         <p:txBody>
@@ -4807,7 +4938,7 @@
                 <a:latin typeface="Arial" panose="020B0604020202020204" pitchFamily="34" charset="0"/>
                 <a:cs typeface="Arial" panose="020B0604020202020204" pitchFamily="34" charset="0"/>
               </a:rPr>
-              <a:t>{UNIT}</a:t>
+              <a:t>{Lesson}</a:t>
             </a:r>
           </a:p>
           <a:p>
@@ -4815,12 +4946,16 @@
               <a:buNone/>
             </a:pPr>
             <a:r>
-              <a:rPr lang="en-US" sz="6000" dirty="0">
+              <a:rPr lang="en-US" dirty="0">
                 <a:latin typeface="Arial" panose="020B0604020202020204" pitchFamily="34" charset="0"/>
                 <a:cs typeface="Arial" panose="020B0604020202020204" pitchFamily="34" charset="0"/>
               </a:rPr>
-              <a:t>{COURSE}</a:t>
-            </a:r>
+              <a:t>MASTER SLIDE DECK</a:t>
+            </a:r>
+            <a:endParaRPr lang="en-US" sz="6000" dirty="0">
+              <a:latin typeface="Arial" panose="020B0604020202020204" pitchFamily="34" charset="0"/>
+              <a:cs typeface="Arial" panose="020B0604020202020204" pitchFamily="34" charset="0"/>
+            </a:endParaRPr>
           </a:p>
         </p:txBody>
       </p:sp>
@@ -4829,7 +4964,7 @@
           <p:cNvPr id="3" name="Text Placeholder 2">
             <a:extLst>
               <a:ext uri="{FF2B5EF4-FFF2-40B4-BE49-F238E27FC236}">
-                <a16:creationId xmlns:a16="http://schemas.microsoft.com/office/drawing/2014/main" id="{4B24374E-4CC2-709F-BC3B-354075F6FB78}"/>
+                <a16:creationId xmlns:a16="http://schemas.microsoft.com/office/drawing/2014/main" id="{D94C7E47-63B7-8E9D-6345-B12B99DBCE2B}"/>
               </a:ext>
             </a:extLst>
           </p:cNvPr>
@@ -4846,13 +4981,203 @@
           <a:lstStyle/>
           <a:p>
             <a:endParaRPr lang="en-US"/>
+          </a:p>
+        </p:txBody>
+      </p:sp>
+      <p:sp>
+        <p:nvSpPr>
+          <p:cNvPr id="4" name="English">
+            <a:extLst>
+              <a:ext uri="{FF2B5EF4-FFF2-40B4-BE49-F238E27FC236}">
+                <a16:creationId xmlns:a16="http://schemas.microsoft.com/office/drawing/2014/main" id="{C31D1D8F-E2D1-CB6B-82AF-68C852DD3028}"/>
+              </a:ext>
+            </a:extLst>
+          </p:cNvPr>
+          <p:cNvSpPr/>
+          <p:nvPr/>
+        </p:nvSpPr>
+        <p:spPr>
+          <a:xfrm>
+            <a:off x="5434907" y="5220773"/>
+            <a:ext cx="1270001" cy="1270001"/>
+          </a:xfrm>
+          <a:prstGeom prst="rect">
+            <a:avLst/>
+          </a:prstGeom>
+          <a:solidFill>
+            <a:srgbClr val="FFFB00"/>
+          </a:solidFill>
+          <a:ln w="12700">
+            <a:solidFill>
+              <a:schemeClr val="accent1"/>
+            </a:solidFill>
+            <a:miter/>
+          </a:ln>
+          <a:extLst>
+            <a:ext uri="{C572A759-6A51-4108-AA02-DFA0A04FC94B}">
+              <ma14:wrappingTextBoxFlag xmlns:ma14="http://schemas.microsoft.com/office/mac/drawingml/2011/main" xmlns:a14="http://schemas.microsoft.com/office/drawing/2010/main" xmlns:m="http://schemas.openxmlformats.org/officeDocument/2006/math" xmlns="" val="1"/>
+            </a:ext>
+          </a:extLst>
+        </p:spPr>
+        <p:txBody>
+          <a:bodyPr lIns="45719" rIns="45719" anchor="ctr"/>
+          <a:lstStyle>
+            <a:lvl1pPr algn="ctr"/>
+          </a:lstStyle>
+          <a:p>
+            <a:r>
+              <a:t>English</a:t>
+            </a:r>
+          </a:p>
+        </p:txBody>
+      </p:sp>
+      <p:sp>
+        <p:nvSpPr>
+          <p:cNvPr id="5" name="Spanish">
+            <a:extLst>
+              <a:ext uri="{FF2B5EF4-FFF2-40B4-BE49-F238E27FC236}">
+                <a16:creationId xmlns:a16="http://schemas.microsoft.com/office/drawing/2014/main" id="{EDFC117A-2C79-EBA2-E09B-3CA32F1663F2}"/>
+              </a:ext>
+            </a:extLst>
+          </p:cNvPr>
+          <p:cNvSpPr/>
+          <p:nvPr/>
+        </p:nvSpPr>
+        <p:spPr>
+          <a:xfrm>
+            <a:off x="7065372" y="5220773"/>
+            <a:ext cx="1270001" cy="1270001"/>
+          </a:xfrm>
+          <a:prstGeom prst="rect">
+            <a:avLst/>
+          </a:prstGeom>
+          <a:solidFill>
+            <a:srgbClr val="FF9300"/>
+          </a:solidFill>
+          <a:ln w="12700">
+            <a:solidFill>
+              <a:schemeClr val="accent1"/>
+            </a:solidFill>
+            <a:miter/>
+          </a:ln>
+          <a:extLst>
+            <a:ext uri="{C572A759-6A51-4108-AA02-DFA0A04FC94B}">
+              <ma14:wrappingTextBoxFlag xmlns:ma14="http://schemas.microsoft.com/office/mac/drawingml/2011/main" xmlns:a14="http://schemas.microsoft.com/office/drawing/2010/main" xmlns:m="http://schemas.openxmlformats.org/officeDocument/2006/math" xmlns="" val="1"/>
+            </a:ext>
+          </a:extLst>
+        </p:spPr>
+        <p:txBody>
+          <a:bodyPr lIns="45719" rIns="45719" anchor="ctr"/>
+          <a:lstStyle>
+            <a:lvl1pPr algn="ctr"/>
+          </a:lstStyle>
+          <a:p>
+            <a:r>
+              <a:rPr dirty="0"/>
+              <a:t>Spanish</a:t>
+            </a:r>
+            <a:r>
+              <a:rPr lang="en-US" dirty="0"/>
+              <a:t> with details</a:t>
+            </a:r>
+            <a:endParaRPr dirty="0"/>
+          </a:p>
+        </p:txBody>
+      </p:sp>
+      <p:sp>
+        <p:nvSpPr>
+          <p:cNvPr id="6" name="This master slide deck is NOT used for presentation.">
+            <a:extLst>
+              <a:ext uri="{FF2B5EF4-FFF2-40B4-BE49-F238E27FC236}">
+                <a16:creationId xmlns:a16="http://schemas.microsoft.com/office/drawing/2014/main" id="{7112FC64-993F-6384-207F-8A58E6A57975}"/>
+              </a:ext>
+            </a:extLst>
+          </p:cNvPr>
+          <p:cNvSpPr txBox="1"/>
+          <p:nvPr/>
+        </p:nvSpPr>
+        <p:spPr>
+          <a:xfrm>
+            <a:off x="3622701" y="6550692"/>
+            <a:ext cx="4946598" cy="333089"/>
+          </a:xfrm>
+          <a:prstGeom prst="rect">
+            <a:avLst/>
+          </a:prstGeom>
+          <a:ln w="12700">
+            <a:miter lim="400000"/>
+          </a:ln>
+          <a:extLst>
+            <a:ext uri="{C572A759-6A51-4108-AA02-DFA0A04FC94B}">
+              <ma14:wrappingTextBoxFlag xmlns:ma14="http://schemas.microsoft.com/office/mac/drawingml/2011/main" xmlns:a14="http://schemas.microsoft.com/office/drawing/2010/main" xmlns:m="http://schemas.openxmlformats.org/officeDocument/2006/math" xmlns="" val="1"/>
+            </a:ext>
+          </a:extLst>
+        </p:spPr>
+        <p:txBody>
+          <a:bodyPr wrap="none" lIns="45719" rIns="45719">
+            <a:spAutoFit/>
+          </a:bodyPr>
+          <a:lstStyle/>
+          <a:p>
+            <a:r>
+              <a:t>This master slide deck is NOT used for presentation. </a:t>
+            </a:r>
+          </a:p>
+        </p:txBody>
+      </p:sp>
+      <p:sp>
+        <p:nvSpPr>
+          <p:cNvPr id="7" name="English">
+            <a:extLst>
+              <a:ext uri="{FF2B5EF4-FFF2-40B4-BE49-F238E27FC236}">
+                <a16:creationId xmlns:a16="http://schemas.microsoft.com/office/drawing/2014/main" id="{05CF1E25-6DF7-E46F-66E5-B04F317BEF77}"/>
+              </a:ext>
+            </a:extLst>
+          </p:cNvPr>
+          <p:cNvSpPr/>
+          <p:nvPr/>
+        </p:nvSpPr>
+        <p:spPr>
+          <a:xfrm>
+            <a:off x="3622702" y="5220772"/>
+            <a:ext cx="1424140" cy="1270001"/>
+          </a:xfrm>
+          <a:prstGeom prst="rect">
+            <a:avLst/>
+          </a:prstGeom>
+          <a:solidFill>
+            <a:schemeClr val="bg1"/>
+          </a:solidFill>
+          <a:ln w="12700">
+            <a:solidFill>
+              <a:schemeClr val="accent1"/>
+            </a:solidFill>
+            <a:miter/>
+          </a:ln>
+          <a:extLst>
+            <a:ext uri="{C572A759-6A51-4108-AA02-DFA0A04FC94B}">
+              <ma14:wrappingTextBoxFlag xmlns:ma14="http://schemas.microsoft.com/office/mac/drawingml/2011/main" xmlns:a14="http://schemas.microsoft.com/office/drawing/2010/main" xmlns:m="http://schemas.openxmlformats.org/officeDocument/2006/math" xmlns="" val="1"/>
+            </a:ext>
+          </a:extLst>
+        </p:spPr>
+        <p:txBody>
+          <a:bodyPr lIns="45719" rIns="45719" anchor="ctr"/>
+          <a:lstStyle>
+            <a:lvl1pPr algn="ctr"/>
+          </a:lstStyle>
+          <a:p>
+            <a:r>
+              <a:rPr lang="en-US" dirty="0"/>
+              <a:t>For presentation</a:t>
+            </a:r>
+            <a:endParaRPr dirty="0"/>
           </a:p>
         </p:txBody>
       </p:sp>
     </p:spTree>
     <p:extLst>
       <p:ext uri="{BB962C8B-B14F-4D97-AF65-F5344CB8AC3E}">
-        <p14:creationId xmlns:p14="http://schemas.microsoft.com/office/powerpoint/2010/main" val="1013508056"/>
+        <p14:creationId xmlns:p14="http://schemas.microsoft.com/office/powerpoint/2010/main" val="1561663183"/>
       </p:ext>
     </p:extLst>
   </p:cSld>
@@ -4881,43 +5206,57 @@
       </p:grpSpPr>
       <p:sp>
         <p:nvSpPr>
-          <p:cNvPr id="2" name="Title 1">
-            <a:extLst>
-              <a:ext uri="{FF2B5EF4-FFF2-40B4-BE49-F238E27FC236}">
-                <a16:creationId xmlns:a16="http://schemas.microsoft.com/office/drawing/2014/main" id="{0E7CCAEB-D84E-456D-3B6B-2E9573C73F98}"/>
-              </a:ext>
-            </a:extLst>
-          </p:cNvPr>
-          <p:cNvSpPr>
-            <a:spLocks noGrp="1"/>
-          </p:cNvSpPr>
-          <p:nvPr>
-            <p:ph type="title"/>
-          </p:nvPr>
-        </p:nvSpPr>
-        <p:spPr/>
+          <p:cNvPr id="2" name="Content Placeholder 1">
+            <a:extLst>
+              <a:ext uri="{FF2B5EF4-FFF2-40B4-BE49-F238E27FC236}">
+                <a16:creationId xmlns:a16="http://schemas.microsoft.com/office/drawing/2014/main" id="{7C1822AB-D5F0-D579-A820-812EE3C83EDD}"/>
+              </a:ext>
+            </a:extLst>
+          </p:cNvPr>
+          <p:cNvSpPr>
+            <a:spLocks noGrp="1"/>
+          </p:cNvSpPr>
+          <p:nvPr>
+            <p:ph/>
+          </p:nvPr>
+        </p:nvSpPr>
+        <p:spPr>
+          <a:xfrm>
+            <a:off x="375127" y="2963211"/>
+            <a:ext cx="11441743" cy="1061102"/>
+          </a:xfrm>
+        </p:spPr>
         <p:txBody>
           <a:bodyPr/>
           <a:lstStyle/>
           <a:p>
-            <a:endParaRPr lang="en-US"/>
-          </a:p>
-        </p:txBody>
-      </p:sp>
-      <p:sp>
-        <p:nvSpPr>
-          <p:cNvPr id="3" name="Content Placeholder 2">
-            <a:extLst>
-              <a:ext uri="{FF2B5EF4-FFF2-40B4-BE49-F238E27FC236}">
-                <a16:creationId xmlns:a16="http://schemas.microsoft.com/office/drawing/2014/main" id="{0A5EC664-EFAD-501E-02EA-4124C835D47B}"/>
-              </a:ext>
-            </a:extLst>
-          </p:cNvPr>
-          <p:cNvSpPr>
-            <a:spLocks noGrp="1"/>
-          </p:cNvSpPr>
-          <p:nvPr>
-            <p:ph idx="1"/>
+            <a:pPr marL="0" indent="0" algn="ctr">
+              <a:buNone/>
+            </a:pPr>
+            <a:r>
+              <a:rPr lang="en-US" sz="6000" dirty="0">
+                <a:latin typeface="Arial" panose="020B0604020202020204" pitchFamily="34" charset="0"/>
+                <a:cs typeface="Arial" panose="020B0604020202020204" pitchFamily="34" charset="0"/>
+              </a:rPr>
+              <a:t>{Lesson}</a:t>
+            </a:r>
+          </a:p>
+        </p:txBody>
+      </p:sp>
+      <p:sp>
+        <p:nvSpPr>
+          <p:cNvPr id="3" name="Text Placeholder 2">
+            <a:extLst>
+              <a:ext uri="{FF2B5EF4-FFF2-40B4-BE49-F238E27FC236}">
+                <a16:creationId xmlns:a16="http://schemas.microsoft.com/office/drawing/2014/main" id="{D94C7E47-63B7-8E9D-6345-B12B99DBCE2B}"/>
+              </a:ext>
+            </a:extLst>
+          </p:cNvPr>
+          <p:cNvSpPr>
+            <a:spLocks noGrp="1"/>
+          </p:cNvSpPr>
+          <p:nvPr>
+            <p:ph type="body" sz="quarter" idx="10"/>
           </p:nvPr>
         </p:nvSpPr>
         <p:spPr/>
@@ -4932,7 +5271,7 @@
     </p:spTree>
     <p:extLst>
       <p:ext uri="{BB962C8B-B14F-4D97-AF65-F5344CB8AC3E}">
-        <p14:creationId xmlns:p14="http://schemas.microsoft.com/office/powerpoint/2010/main" val="2792640674"/>
+        <p14:creationId xmlns:p14="http://schemas.microsoft.com/office/powerpoint/2010/main" val="2329516533"/>
       </p:ext>
     </p:extLst>
   </p:cSld>
@@ -4959,51 +5298,12 @@
           <a:chExt cx="0" cy="0"/>
         </a:xfrm>
       </p:grpSpPr>
-      <p:pic>
-        <p:nvPicPr>
-          <p:cNvPr id="8" name="Picture 7" descr="Question marks in a line and one question mark is lit">
-            <a:extLst>
-              <a:ext uri="{FF2B5EF4-FFF2-40B4-BE49-F238E27FC236}">
-                <a16:creationId xmlns:a16="http://schemas.microsoft.com/office/drawing/2014/main" id="{12797137-2A82-CF84-DC83-7388192901FD}"/>
-              </a:ext>
-            </a:extLst>
-          </p:cNvPr>
-          <p:cNvPicPr>
-            <a:picLocks noChangeAspect="1"/>
-          </p:cNvPicPr>
-          <p:nvPr/>
-        </p:nvPicPr>
-        <p:blipFill rotWithShape="1">
-          <a:blip r:embed="rId2" cstate="print">
-            <a:extLst>
-              <a:ext uri="{28A0092B-C50C-407E-A947-70E740481C1C}">
-                <a14:useLocalDpi xmlns:a14="http://schemas.microsoft.com/office/drawing/2010/main"/>
-              </a:ext>
-            </a:extLst>
-          </a:blip>
-          <a:srcRect/>
-          <a:stretch/>
-        </p:blipFill>
-        <p:spPr>
-          <a:xfrm>
-            <a:off x="609480" y="1604520"/>
-            <a:ext cx="10972440" cy="3977280"/>
-          </a:xfrm>
-          <a:prstGeom prst="rect">
-            <a:avLst/>
-          </a:prstGeom>
-          <a:noFill/>
-          <a:ln w="0">
-            <a:noFill/>
-          </a:ln>
-        </p:spPr>
-      </p:pic>
-      <p:sp>
-        <p:nvSpPr>
-          <p:cNvPr id="5" name="Title 4">
-            <a:extLst>
-              <a:ext uri="{FF2B5EF4-FFF2-40B4-BE49-F238E27FC236}">
-                <a16:creationId xmlns:a16="http://schemas.microsoft.com/office/drawing/2014/main" id="{D165FB1A-692C-4624-ECCE-A294CCE7B105}"/>
+      <p:sp>
+        <p:nvSpPr>
+          <p:cNvPr id="2" name="Title 1">
+            <a:extLst>
+              <a:ext uri="{FF2B5EF4-FFF2-40B4-BE49-F238E27FC236}">
+                <a16:creationId xmlns:a16="http://schemas.microsoft.com/office/drawing/2014/main" id="{0E7CCAEB-D84E-456D-3B6B-2E9573C73F98}"/>
               </a:ext>
             </a:extLst>
           </p:cNvPr>
@@ -5014,38 +5314,44 @@
             <p:ph type="title"/>
           </p:nvPr>
         </p:nvSpPr>
-        <p:spPr>
-          <a:xfrm>
-            <a:off x="1453320" y="262440"/>
-            <a:ext cx="9018360" cy="907454"/>
-          </a:xfrm>
-        </p:spPr>
-        <p:txBody>
-          <a:bodyPr anchor="t">
-            <a:normAutofit/>
-          </a:bodyPr>
-          <a:lstStyle/>
-          <a:p>
-            <a:pPr marL="0" indent="0" algn="ctr">
-              <a:buNone/>
-            </a:pPr>
-            <a:r>
-              <a:rPr lang="en-US" sz="3800" b="1" dirty="0">
-                <a:solidFill>
-                  <a:srgbClr val="000000"/>
-                </a:solidFill>
-                <a:latin typeface="Arial" panose="020B0604020202020204" pitchFamily="34" charset="0"/>
-                <a:cs typeface="Arial" panose="020B0604020202020204" pitchFamily="34" charset="0"/>
-              </a:rPr>
-              <a:t>Why Does It Matter To You?</a:t>
-            </a:r>
+        <p:spPr/>
+        <p:txBody>
+          <a:bodyPr/>
+          <a:lstStyle/>
+          <a:p>
+            <a:endParaRPr lang="en-US"/>
+          </a:p>
+        </p:txBody>
+      </p:sp>
+      <p:sp>
+        <p:nvSpPr>
+          <p:cNvPr id="3" name="Content Placeholder 2">
+            <a:extLst>
+              <a:ext uri="{FF2B5EF4-FFF2-40B4-BE49-F238E27FC236}">
+                <a16:creationId xmlns:a16="http://schemas.microsoft.com/office/drawing/2014/main" id="{0A5EC664-EFAD-501E-02EA-4124C835D47B}"/>
+              </a:ext>
+            </a:extLst>
+          </p:cNvPr>
+          <p:cNvSpPr>
+            <a:spLocks noGrp="1"/>
+          </p:cNvSpPr>
+          <p:nvPr>
+            <p:ph idx="1"/>
+          </p:nvPr>
+        </p:nvSpPr>
+        <p:spPr/>
+        <p:txBody>
+          <a:bodyPr/>
+          <a:lstStyle/>
+          <a:p>
+            <a:endParaRPr lang="en-US"/>
           </a:p>
         </p:txBody>
       </p:sp>
     </p:spTree>
     <p:extLst>
       <p:ext uri="{BB962C8B-B14F-4D97-AF65-F5344CB8AC3E}">
-        <p14:creationId xmlns:p14="http://schemas.microsoft.com/office/powerpoint/2010/main" val="2358251488"/>
+        <p14:creationId xmlns:p14="http://schemas.microsoft.com/office/powerpoint/2010/main" val="2792640674"/>
       </p:ext>
     </p:extLst>
   </p:cSld>
@@ -5056,6 +5362,127 @@
 </file>
 
 <file path=ppt/slides/slide4.xml><?xml version="1.0" encoding="utf-8"?>
+<p:sld xmlns:a="http://schemas.openxmlformats.org/drawingml/2006/main" xmlns:r="http://schemas.openxmlformats.org/officeDocument/2006/relationships" xmlns:p="http://schemas.openxmlformats.org/presentationml/2006/main">
+  <p:cSld>
+    <p:bg>
+      <p:bgPr>
+        <a:solidFill>
+          <a:srgbClr val="FFFF00"/>
+        </a:solidFill>
+        <a:effectLst/>
+      </p:bgPr>
+    </p:bg>
+    <p:spTree>
+      <p:nvGrpSpPr>
+        <p:cNvPr id="1" name=""/>
+        <p:cNvGrpSpPr/>
+        <p:nvPr/>
+      </p:nvGrpSpPr>
+      <p:grpSpPr>
+        <a:xfrm>
+          <a:off x="0" y="0"/>
+          <a:ext cx="0" cy="0"/>
+          <a:chOff x="0" y="0"/>
+          <a:chExt cx="0" cy="0"/>
+        </a:xfrm>
+      </p:grpSpPr>
+      <p:pic>
+        <p:nvPicPr>
+          <p:cNvPr id="185" name="Picture 7" descr="Picture 7"/>
+          <p:cNvPicPr>
+            <a:picLocks noChangeAspect="1"/>
+          </p:cNvPicPr>
+          <p:nvPr/>
+        </p:nvPicPr>
+        <p:blipFill>
+          <a:blip r:embed="rId2"/>
+          <a:stretch>
+            <a:fillRect/>
+          </a:stretch>
+        </p:blipFill>
+        <p:spPr>
+          <a:xfrm>
+            <a:off x="609479" y="1604519"/>
+            <a:ext cx="10972442" cy="3977282"/>
+          </a:xfrm>
+          <a:prstGeom prst="rect">
+            <a:avLst/>
+          </a:prstGeom>
+          <a:ln w="12700">
+            <a:miter lim="400000"/>
+          </a:ln>
+        </p:spPr>
+      </p:pic>
+      <p:sp>
+        <p:nvSpPr>
+          <p:cNvPr id="186" name="Title 4"/>
+          <p:cNvSpPr txBox="1">
+            <a:spLocks noGrp="1"/>
+          </p:cNvSpPr>
+          <p:nvPr>
+            <p:ph type="title"/>
+          </p:nvPr>
+        </p:nvSpPr>
+        <p:spPr>
+          <a:xfrm>
+            <a:off x="1453319" y="262439"/>
+            <a:ext cx="9018362" cy="907455"/>
+          </a:xfrm>
+          <a:prstGeom prst="rect">
+            <a:avLst/>
+          </a:prstGeom>
+        </p:spPr>
+        <p:txBody>
+          <a:bodyPr anchor="t"/>
+          <a:lstStyle/>
+          <a:p>
+            <a:r>
+              <a:t>Why Does It Matter To You?</a:t>
+            </a:r>
+          </a:p>
+        </p:txBody>
+      </p:sp>
+      <p:sp>
+        <p:nvSpPr>
+          <p:cNvPr id="187" name="Slide Number"/>
+          <p:cNvSpPr txBox="1">
+            <a:spLocks noGrp="1"/>
+          </p:cNvSpPr>
+          <p:nvPr>
+            <p:ph type="sldNum" sz="quarter" idx="2"/>
+          </p:nvPr>
+        </p:nvSpPr>
+        <p:spPr>
+          <a:prstGeom prst="rect">
+            <a:avLst/>
+          </a:prstGeom>
+          <a:extLst>
+            <a:ext uri="{C572A759-6A51-4108-AA02-DFA0A04FC94B}">
+              <ma14:wrappingTextBoxFlag xmlns:ma14="http://schemas.microsoft.com/office/mac/drawingml/2011/main" xmlns:a14="http://schemas.microsoft.com/office/drawing/2010/main" xmlns:m="http://schemas.openxmlformats.org/officeDocument/2006/math" xmlns="" val="1"/>
+            </a:ext>
+          </a:extLst>
+        </p:spPr>
+        <p:txBody>
+          <a:bodyPr/>
+          <a:lstStyle/>
+          <a:p>
+            <a:fld id="{86CB4B4D-7CA3-9044-876B-883B54F8677D}" type="slidenum">
+              <a:t>4</a:t>
+            </a:fld>
+            <a:endParaRPr/>
+          </a:p>
+        </p:txBody>
+      </p:sp>
+    </p:spTree>
+  </p:cSld>
+  <p:clrMapOvr>
+    <a:masterClrMapping/>
+  </p:clrMapOvr>
+  <p:transition spd="med"/>
+</p:sld>
+</file>
+
+<file path=ppt/slides/slide5.xml><?xml version="1.0" encoding="utf-8"?>
 <p:sld xmlns:a="http://schemas.openxmlformats.org/drawingml/2006/main" xmlns:r="http://schemas.openxmlformats.org/officeDocument/2006/relationships" xmlns:p="http://schemas.openxmlformats.org/presentationml/2006/main">
   <p:cSld>
     <p:spTree>
@@ -5072,73 +5499,189 @@
           <a:chExt cx="0" cy="0"/>
         </a:xfrm>
       </p:grpSpPr>
-      <p:sp>
-        <p:nvSpPr>
-          <p:cNvPr id="3" name="Title 2">
-            <a:extLst>
-              <a:ext uri="{FF2B5EF4-FFF2-40B4-BE49-F238E27FC236}">
-                <a16:creationId xmlns:a16="http://schemas.microsoft.com/office/drawing/2014/main" id="{8459A4B7-C890-7C19-9A85-49CF2F1C6DE2}"/>
-              </a:ext>
-            </a:extLst>
-          </p:cNvPr>
-          <p:cNvSpPr>
-            <a:spLocks noGrp="1"/>
-          </p:cNvSpPr>
-          <p:nvPr>
-            <p:ph type="title" idx="4294967295"/>
-          </p:nvPr>
-        </p:nvSpPr>
-        <p:spPr>
-          <a:xfrm>
-            <a:off x="2154607" y="2531860"/>
-            <a:ext cx="3658053" cy="1786515"/>
-          </a:xfrm>
-        </p:spPr>
-        <p:txBody>
-          <a:bodyPr vert="horz" lIns="91440" tIns="45720" rIns="91440" bIns="45720" rtlCol="0" anchor="t">
-            <a:normAutofit/>
-          </a:bodyPr>
-          <a:lstStyle/>
-          <a:p>
-            <a:r>
-              <a:rPr lang="en-US" sz="4800" b="1" kern="1200" dirty="0">
-                <a:solidFill>
-                  <a:schemeClr val="tx2"/>
-                </a:solidFill>
-                <a:latin typeface="+mj-lt"/>
-                <a:ea typeface="+mj-ea"/>
-                <a:cs typeface="+mj-cs"/>
-              </a:rPr>
-              <a:t>TAKE A BREAK</a:t>
-            </a:r>
-          </a:p>
-        </p:txBody>
-      </p:sp>
       <p:pic>
         <p:nvPicPr>
-          <p:cNvPr id="14" name="Graphic 13" descr="Coffee">
-            <a:extLst>
-              <a:ext uri="{FF2B5EF4-FFF2-40B4-BE49-F238E27FC236}">
-                <a16:creationId xmlns:a16="http://schemas.microsoft.com/office/drawing/2014/main" id="{18E50972-98B0-2FA6-4E20-46196C902A48}"/>
-              </a:ext>
-            </a:extLst>
-          </p:cNvPr>
+          <p:cNvPr id="189" name="Picture 7" descr="Picture 7"/>
           <p:cNvPicPr>
             <a:picLocks noChangeAspect="1"/>
           </p:cNvPicPr>
           <p:nvPr/>
         </p:nvPicPr>
         <p:blipFill>
-          <a:blip r:embed="rId3">
-            <a:extLst>
-              <a:ext uri="{28A0092B-C50C-407E-A947-70E740481C1C}">
-                <a14:useLocalDpi xmlns:a14="http://schemas.microsoft.com/office/drawing/2010/main"/>
-              </a:ext>
-              <a:ext uri="{96DAC541-7B7A-43D3-8B79-37D633B846F1}">
-                <asvg:svgBlip xmlns:asvg="http://schemas.microsoft.com/office/drawing/2016/SVG/main" r:embed="rId4"/>
-              </a:ext>
-            </a:extLst>
-          </a:blip>
+          <a:blip r:embed="rId2"/>
+          <a:stretch>
+            <a:fillRect/>
+          </a:stretch>
+        </p:blipFill>
+        <p:spPr>
+          <a:xfrm>
+            <a:off x="609479" y="1604519"/>
+            <a:ext cx="10972442" cy="3977282"/>
+          </a:xfrm>
+          <a:prstGeom prst="rect">
+            <a:avLst/>
+          </a:prstGeom>
+          <a:ln w="12700">
+            <a:miter lim="400000"/>
+          </a:ln>
+        </p:spPr>
+      </p:pic>
+      <p:sp>
+        <p:nvSpPr>
+          <p:cNvPr id="190" name="Title 4"/>
+          <p:cNvSpPr txBox="1">
+            <a:spLocks noGrp="1"/>
+          </p:cNvSpPr>
+          <p:nvPr>
+            <p:ph type="title"/>
+          </p:nvPr>
+        </p:nvSpPr>
+        <p:spPr>
+          <a:xfrm>
+            <a:off x="1453319" y="262439"/>
+            <a:ext cx="9018362" cy="907455"/>
+          </a:xfrm>
+          <a:prstGeom prst="rect">
+            <a:avLst/>
+          </a:prstGeom>
+        </p:spPr>
+        <p:txBody>
+          <a:bodyPr anchor="t"/>
+          <a:lstStyle/>
+          <a:p>
+            <a:r>
+              <a:t>¿Por Qué Te Importa?</a:t>
+            </a:r>
+          </a:p>
+        </p:txBody>
+      </p:sp>
+      <p:sp>
+        <p:nvSpPr>
+          <p:cNvPr id="191" name="Slide Number"/>
+          <p:cNvSpPr txBox="1">
+            <a:spLocks noGrp="1"/>
+          </p:cNvSpPr>
+          <p:nvPr>
+            <p:ph type="sldNum" sz="quarter" idx="2"/>
+          </p:nvPr>
+        </p:nvSpPr>
+        <p:spPr>
+          <a:prstGeom prst="rect">
+            <a:avLst/>
+          </a:prstGeom>
+          <a:extLst>
+            <a:ext uri="{C572A759-6A51-4108-AA02-DFA0A04FC94B}">
+              <ma14:wrappingTextBoxFlag xmlns:ma14="http://schemas.microsoft.com/office/mac/drawingml/2011/main" xmlns:a14="http://schemas.microsoft.com/office/drawing/2010/main" xmlns:m="http://schemas.openxmlformats.org/officeDocument/2006/math" xmlns="" val="1"/>
+            </a:ext>
+          </a:extLst>
+        </p:spPr>
+        <p:txBody>
+          <a:bodyPr/>
+          <a:lstStyle/>
+          <a:p>
+            <a:fld id="{86CB4B4D-7CA3-9044-876B-883B54F8677D}" type="slidenum">
+              <a:t>5</a:t>
+            </a:fld>
+            <a:endParaRPr/>
+          </a:p>
+        </p:txBody>
+      </p:sp>
+    </p:spTree>
+  </p:cSld>
+  <p:clrMapOvr>
+    <a:masterClrMapping/>
+  </p:clrMapOvr>
+  <mc:AlternateContent xmlns:mc="http://schemas.openxmlformats.org/markup-compatibility/2006" xmlns:p14="http://schemas.microsoft.com/office/powerpoint/2010/main">
+    <mc:Choice Requires="p14">
+      <p:transition spd="slow" p14:dur="1200">
+        <p:push dir="u"/>
+      </p:transition>
+    </mc:Choice>
+    <mc:Fallback xmlns:a14="http://schemas.microsoft.com/office/drawing/2010/main" xmlns:m="http://schemas.openxmlformats.org/officeDocument/2006/math" xmlns="">
+      <p:transition spd="slow">
+        <p:fade/>
+      </p:transition>
+    </mc:Fallback>
+  </mc:AlternateContent>
+</p:sld>
+</file>
+
+<file path=ppt/slides/slide6.xml><?xml version="1.0" encoding="utf-8"?>
+<p:sld xmlns:a="http://schemas.openxmlformats.org/drawingml/2006/main" xmlns:r="http://schemas.openxmlformats.org/officeDocument/2006/relationships" xmlns:p="http://schemas.openxmlformats.org/presentationml/2006/main">
+  <p:cSld>
+    <p:bg>
+      <p:bgPr>
+        <a:solidFill>
+          <a:srgbClr val="FFFF00"/>
+        </a:solidFill>
+        <a:effectLst/>
+      </p:bgPr>
+    </p:bg>
+    <p:spTree>
+      <p:nvGrpSpPr>
+        <p:cNvPr id="1" name=""/>
+        <p:cNvGrpSpPr/>
+        <p:nvPr/>
+      </p:nvGrpSpPr>
+      <p:grpSpPr>
+        <a:xfrm>
+          <a:off x="0" y="0"/>
+          <a:ext cx="0" cy="0"/>
+          <a:chOff x="0" y="0"/>
+          <a:chExt cx="0" cy="0"/>
+        </a:xfrm>
+      </p:grpSpPr>
+      <p:sp>
+        <p:nvSpPr>
+          <p:cNvPr id="193" name="Title 2"/>
+          <p:cNvSpPr txBox="1">
+            <a:spLocks noGrp="1"/>
+          </p:cNvSpPr>
+          <p:nvPr>
+            <p:ph type="title" idx="4294967295"/>
+          </p:nvPr>
+        </p:nvSpPr>
+        <p:spPr>
+          <a:xfrm>
+            <a:off x="2154607" y="2531859"/>
+            <a:ext cx="3658054" cy="1786516"/>
+          </a:xfrm>
+          <a:prstGeom prst="rect">
+            <a:avLst/>
+          </a:prstGeom>
+        </p:spPr>
+        <p:txBody>
+          <a:bodyPr anchor="t"/>
+          <a:lstStyle>
+            <a:lvl1pPr>
+              <a:defRPr sz="4800" b="0">
+                <a:solidFill>
+                  <a:srgbClr val="44546A"/>
+                </a:solidFill>
+                <a:latin typeface="Calibri Light"/>
+                <a:ea typeface="Calibri Light"/>
+                <a:cs typeface="Calibri Light"/>
+                <a:sym typeface="Calibri Light"/>
+              </a:defRPr>
+            </a:lvl1pPr>
+          </a:lstStyle>
+          <a:p>
+            <a:r>
+              <a:t>TAKE A BREAK</a:t>
+            </a:r>
+          </a:p>
+        </p:txBody>
+      </p:sp>
+      <p:pic>
+        <p:nvPicPr>
+          <p:cNvPr id="194" name="Graphic 13" descr="Graphic 13"/>
+          <p:cNvPicPr>
+            <a:picLocks noChangeAspect="1"/>
+          </p:cNvPicPr>
+          <p:nvPr/>
+        </p:nvPicPr>
+        <p:blipFill>
+          <a:blip r:embed="rId2"/>
           <a:stretch>
             <a:fillRect/>
           </a:stretch>
@@ -5146,69 +5689,268 @@
         <p:spPr>
           <a:xfrm>
             <a:off x="6379342" y="-259377"/>
-            <a:ext cx="5029200" cy="5029200"/>
+            <a:ext cx="5029201" cy="5029201"/>
           </a:xfrm>
           <a:prstGeom prst="rect">
             <a:avLst/>
           </a:prstGeom>
-          <a:ln w="9525">
-            <a:noFill/>
+          <a:ln w="12700">
+            <a:miter lim="400000"/>
           </a:ln>
         </p:spPr>
       </p:pic>
       <p:sp>
         <p:nvSpPr>
-          <p:cNvPr id="2" name="TextBox 1">
-            <a:extLst>
-              <a:ext uri="{FF2B5EF4-FFF2-40B4-BE49-F238E27FC236}">
-                <a16:creationId xmlns:a16="http://schemas.microsoft.com/office/drawing/2014/main" id="{A1B7F749-D607-3F3E-08CD-A06E76E4C25B}"/>
-              </a:ext>
-            </a:extLst>
-          </p:cNvPr>
+          <p:cNvPr id="195" name="TextBox 1"/>
           <p:cNvSpPr txBox="1"/>
           <p:nvPr/>
         </p:nvSpPr>
         <p:spPr>
           <a:xfrm>
-            <a:off x="3669695" y="5405718"/>
-            <a:ext cx="4852610" cy="738664"/>
+            <a:off x="3715415" y="5405718"/>
+            <a:ext cx="3986136" cy="634118"/>
           </a:xfrm>
           <a:prstGeom prst="rect">
             <a:avLst/>
           </a:prstGeom>
-          <a:noFill/>
+          <a:ln w="12700">
+            <a:miter lim="400000"/>
+          </a:ln>
+          <a:extLst>
+            <a:ext uri="{C572A759-6A51-4108-AA02-DFA0A04FC94B}">
+              <ma14:wrappingTextBoxFlag xmlns:ma14="http://schemas.microsoft.com/office/mac/drawingml/2011/main" xmlns:a14="http://schemas.microsoft.com/office/drawing/2010/main" xmlns:m="http://schemas.openxmlformats.org/officeDocument/2006/math" xmlns="" val="1"/>
+            </a:ext>
+          </a:extLst>
         </p:spPr>
         <p:txBody>
-          <a:bodyPr wrap="none" rtlCol="0">
+          <a:bodyPr wrap="none" lIns="45719" rIns="45719">
             <a:spAutoFit/>
           </a:bodyPr>
-          <a:lstStyle/>
-          <a:p>
-            <a:r>
-              <a:rPr lang="en-US" sz="4200" b="1" dirty="0"/>
+          <a:lstStyle>
+            <a:lvl1pPr>
+              <a:defRPr sz="4200" b="1"/>
+            </a:lvl1pPr>
+          </a:lstStyle>
+          <a:p>
+            <a:r>
               <a:t>Return By: XX:XX </a:t>
             </a:r>
           </a:p>
         </p:txBody>
       </p:sp>
+      <p:sp>
+        <p:nvSpPr>
+          <p:cNvPr id="196" name="Slide Number"/>
+          <p:cNvSpPr txBox="1">
+            <a:spLocks noGrp="1"/>
+          </p:cNvSpPr>
+          <p:nvPr>
+            <p:ph type="sldNum" sz="quarter" idx="2"/>
+          </p:nvPr>
+        </p:nvSpPr>
+        <p:spPr>
+          <a:prstGeom prst="rect">
+            <a:avLst/>
+          </a:prstGeom>
+          <a:extLst>
+            <a:ext uri="{C572A759-6A51-4108-AA02-DFA0A04FC94B}">
+              <ma14:wrappingTextBoxFlag xmlns:ma14="http://schemas.microsoft.com/office/mac/drawingml/2011/main" xmlns:a14="http://schemas.microsoft.com/office/drawing/2010/main" xmlns:m="http://schemas.openxmlformats.org/officeDocument/2006/math" xmlns="" val="1"/>
+            </a:ext>
+          </a:extLst>
+        </p:spPr>
+        <p:txBody>
+          <a:bodyPr/>
+          <a:lstStyle/>
+          <a:p>
+            <a:fld id="{86CB4B4D-7CA3-9044-876B-883B54F8677D}" type="slidenum">
+              <a:rPr/>
+              <a:t>6</a:t>
+            </a:fld>
+            <a:endParaRPr/>
+          </a:p>
+        </p:txBody>
+      </p:sp>
     </p:spTree>
-    <p:extLst>
-      <p:ext uri="{BB962C8B-B14F-4D97-AF65-F5344CB8AC3E}">
-        <p14:creationId xmlns:p14="http://schemas.microsoft.com/office/powerpoint/2010/main" val="1316225382"/>
-      </p:ext>
-    </p:extLst>
   </p:cSld>
   <p:clrMapOvr>
     <a:masterClrMapping/>
   </p:clrMapOvr>
-  <p:transition spd="slow">
-    <p:push dir="u"/>
-    <p:sndAc>
-      <p:stSnd>
-        <p:snd r:embed="rId2" name="voltage.wav"/>
-      </p:stSnd>
-    </p:sndAc>
-  </p:transition>
+  <mc:AlternateContent xmlns:mc="http://schemas.openxmlformats.org/markup-compatibility/2006" xmlns:p14="http://schemas.microsoft.com/office/powerpoint/2010/main">
+    <mc:Choice Requires="p14">
+      <p:transition spd="slow" p14:dur="1200">
+        <p:push dir="u"/>
+      </p:transition>
+    </mc:Choice>
+    <mc:Fallback xmlns:a14="http://schemas.microsoft.com/office/drawing/2010/main" xmlns:m="http://schemas.openxmlformats.org/officeDocument/2006/math" xmlns="">
+      <p:transition spd="slow">
+        <p:fade/>
+      </p:transition>
+    </mc:Fallback>
+  </mc:AlternateContent>
+</p:sld>
+</file>
+
+<file path=ppt/slides/slide7.xml><?xml version="1.0" encoding="utf-8"?>
+<p:sld xmlns:a="http://schemas.openxmlformats.org/drawingml/2006/main" xmlns:r="http://schemas.openxmlformats.org/officeDocument/2006/relationships" xmlns:p="http://schemas.openxmlformats.org/presentationml/2006/main">
+  <p:cSld>
+    <p:spTree>
+      <p:nvGrpSpPr>
+        <p:cNvPr id="1" name=""/>
+        <p:cNvGrpSpPr/>
+        <p:nvPr/>
+      </p:nvGrpSpPr>
+      <p:grpSpPr>
+        <a:xfrm>
+          <a:off x="0" y="0"/>
+          <a:ext cx="0" cy="0"/>
+          <a:chOff x="0" y="0"/>
+          <a:chExt cx="0" cy="0"/>
+        </a:xfrm>
+      </p:grpSpPr>
+      <p:sp>
+        <p:nvSpPr>
+          <p:cNvPr id="198" name="Title 2"/>
+          <p:cNvSpPr txBox="1">
+            <a:spLocks noGrp="1"/>
+          </p:cNvSpPr>
+          <p:nvPr>
+            <p:ph type="title" idx="4294967295"/>
+          </p:nvPr>
+        </p:nvSpPr>
+        <p:spPr>
+          <a:xfrm>
+            <a:off x="2154607" y="2531859"/>
+            <a:ext cx="3658054" cy="1786516"/>
+          </a:xfrm>
+          <a:prstGeom prst="rect">
+            <a:avLst/>
+          </a:prstGeom>
+        </p:spPr>
+        <p:txBody>
+          <a:bodyPr anchor="t"/>
+          <a:lstStyle>
+            <a:lvl1pPr>
+              <a:defRPr sz="4800" b="0">
+                <a:solidFill>
+                  <a:srgbClr val="44546A"/>
+                </a:solidFill>
+                <a:latin typeface="Calibri Light"/>
+                <a:ea typeface="Calibri Light"/>
+                <a:cs typeface="Calibri Light"/>
+                <a:sym typeface="Calibri Light"/>
+              </a:defRPr>
+            </a:lvl1pPr>
+          </a:lstStyle>
+          <a:p>
+            <a:r>
+              <a:t>TOMAR UN DESCANSO</a:t>
+            </a:r>
+          </a:p>
+        </p:txBody>
+      </p:sp>
+      <p:pic>
+        <p:nvPicPr>
+          <p:cNvPr id="199" name="Graphic 13" descr="Graphic 13"/>
+          <p:cNvPicPr>
+            <a:picLocks noChangeAspect="1"/>
+          </p:cNvPicPr>
+          <p:nvPr/>
+        </p:nvPicPr>
+        <p:blipFill>
+          <a:blip r:embed="rId2"/>
+          <a:stretch>
+            <a:fillRect/>
+          </a:stretch>
+        </p:blipFill>
+        <p:spPr>
+          <a:xfrm>
+            <a:off x="6379342" y="-259377"/>
+            <a:ext cx="5029201" cy="5029201"/>
+          </a:xfrm>
+          <a:prstGeom prst="rect">
+            <a:avLst/>
+          </a:prstGeom>
+          <a:ln w="12700">
+            <a:miter lim="400000"/>
+          </a:ln>
+        </p:spPr>
+      </p:pic>
+      <p:sp>
+        <p:nvSpPr>
+          <p:cNvPr id="200" name="TextBox 1"/>
+          <p:cNvSpPr txBox="1"/>
+          <p:nvPr/>
+        </p:nvSpPr>
+        <p:spPr>
+          <a:xfrm>
+            <a:off x="3715415" y="5405718"/>
+            <a:ext cx="4111933" cy="634118"/>
+          </a:xfrm>
+          <a:prstGeom prst="rect">
+            <a:avLst/>
+          </a:prstGeom>
+          <a:ln w="12700">
+            <a:miter lim="400000"/>
+          </a:ln>
+          <a:extLst>
+            <a:ext uri="{C572A759-6A51-4108-AA02-DFA0A04FC94B}">
+              <ma14:wrappingTextBoxFlag xmlns:ma14="http://schemas.microsoft.com/office/mac/drawingml/2011/main" xmlns:a14="http://schemas.microsoft.com/office/drawing/2010/main" xmlns:m="http://schemas.openxmlformats.org/officeDocument/2006/math" xmlns="" val="1"/>
+            </a:ext>
+          </a:extLst>
+        </p:spPr>
+        <p:txBody>
+          <a:bodyPr wrap="none" lIns="45719" rIns="45719">
+            <a:spAutoFit/>
+          </a:bodyPr>
+          <a:lstStyle>
+            <a:lvl1pPr>
+              <a:defRPr sz="4200" b="1"/>
+            </a:lvl1pPr>
+          </a:lstStyle>
+          <a:p>
+            <a:r>
+              <a:t>Volver por: XX:XX </a:t>
+            </a:r>
+          </a:p>
+        </p:txBody>
+      </p:sp>
+      <p:sp>
+        <p:nvSpPr>
+          <p:cNvPr id="201" name="Slide Number"/>
+          <p:cNvSpPr txBox="1">
+            <a:spLocks noGrp="1"/>
+          </p:cNvSpPr>
+          <p:nvPr>
+            <p:ph type="sldNum" sz="quarter" idx="2"/>
+          </p:nvPr>
+        </p:nvSpPr>
+        <p:spPr>
+          <a:prstGeom prst="rect">
+            <a:avLst/>
+          </a:prstGeom>
+          <a:extLst>
+            <a:ext uri="{C572A759-6A51-4108-AA02-DFA0A04FC94B}">
+              <ma14:wrappingTextBoxFlag xmlns:ma14="http://schemas.microsoft.com/office/mac/drawingml/2011/main" xmlns:a14="http://schemas.microsoft.com/office/drawing/2010/main" xmlns:m="http://schemas.openxmlformats.org/officeDocument/2006/math" xmlns="" val="1"/>
+            </a:ext>
+          </a:extLst>
+        </p:spPr>
+        <p:txBody>
+          <a:bodyPr/>
+          <a:lstStyle/>
+          <a:p>
+            <a:fld id="{86CB4B4D-7CA3-9044-876B-883B54F8677D}" type="slidenum">
+              <a:t>7</a:t>
+            </a:fld>
+            <a:endParaRPr/>
+          </a:p>
+        </p:txBody>
+      </p:sp>
+    </p:spTree>
+  </p:cSld>
+  <p:clrMapOvr>
+    <a:masterClrMapping/>
+  </p:clrMapOvr>
+  <p:transition spd="med"/>
 </p:sld>
 </file>
 

</xml_diff>